<commit_message>
Added more examples; some fixes in presentation
</commit_message>
<xml_diff>
--- a/docs/Markelow.UnitTests.pptx
+++ b/docs/Markelow.UnitTests.pptx
@@ -6,7 +6,7 @@
     <p:sldMasterId id="2147483720" r:id="rId2"/>
   </p:sldMasterIdLst>
   <p:notesMasterIdLst>
-    <p:notesMasterId r:id="rId56"/>
+    <p:notesMasterId r:id="rId57"/>
   </p:notesMasterIdLst>
   <p:sldIdLst>
     <p:sldId id="257" r:id="rId3"/>
@@ -60,8 +60,9 @@
     <p:sldId id="451" r:id="rId51"/>
     <p:sldId id="403" r:id="rId52"/>
     <p:sldId id="443" r:id="rId53"/>
-    <p:sldId id="405" r:id="rId54"/>
-    <p:sldId id="265" r:id="rId55"/>
+    <p:sldId id="452" r:id="rId54"/>
+    <p:sldId id="405" r:id="rId55"/>
+    <p:sldId id="265" r:id="rId56"/>
   </p:sldIdLst>
   <p:sldSz cx="12192000" cy="6858000"/>
   <p:notesSz cx="6858000" cy="9144000"/>
@@ -262,7 +263,7 @@
           <a:p>
             <a:fld id="{F3F49D6A-FD07-4C95-82AD-C104CE84721C}" type="datetimeFigureOut">
               <a:rPr lang="ru-RU" smtClean="0"/>
-              <a:t>20.01.2019</a:t>
+              <a:t>24.01.2019</a:t>
             </a:fld>
             <a:endParaRPr lang="ru-RU"/>
           </a:p>
@@ -4128,6 +4129,94 @@
     <p:extLst>
       <p:ext uri="{BB962C8B-B14F-4D97-AF65-F5344CB8AC3E}">
         <p14:creationId xmlns:p14="http://schemas.microsoft.com/office/powerpoint/2010/main" val="574828655"/>
+      </p:ext>
+    </p:extLst>
+  </p:cSld>
+  <p:clrMapOvr>
+    <a:masterClrMapping/>
+  </p:clrMapOvr>
+</p:notes>
+</file>
+
+<file path=ppt/notesSlides/notesSlide43.xml><?xml version="1.0" encoding="utf-8"?>
+<p:notes xmlns:a="http://schemas.openxmlformats.org/drawingml/2006/main" xmlns:r="http://schemas.openxmlformats.org/officeDocument/2006/relationships" xmlns:p="http://schemas.openxmlformats.org/presentationml/2006/main">
+  <p:cSld>
+    <p:spTree>
+      <p:nvGrpSpPr>
+        <p:cNvPr id="1" name=""/>
+        <p:cNvGrpSpPr/>
+        <p:nvPr/>
+      </p:nvGrpSpPr>
+      <p:grpSpPr>
+        <a:xfrm>
+          <a:off x="0" y="0"/>
+          <a:ext cx="0" cy="0"/>
+          <a:chOff x="0" y="0"/>
+          <a:chExt cx="0" cy="0"/>
+        </a:xfrm>
+      </p:grpSpPr>
+      <p:sp>
+        <p:nvSpPr>
+          <p:cNvPr id="2" name="Образ слайда 1"/>
+          <p:cNvSpPr>
+            <a:spLocks noGrp="1" noRot="1" noChangeAspect="1"/>
+          </p:cNvSpPr>
+          <p:nvPr>
+            <p:ph type="sldImg"/>
+          </p:nvPr>
+        </p:nvSpPr>
+        <p:spPr/>
+      </p:sp>
+      <p:sp>
+        <p:nvSpPr>
+          <p:cNvPr id="3" name="Заметки 2"/>
+          <p:cNvSpPr>
+            <a:spLocks noGrp="1"/>
+          </p:cNvSpPr>
+          <p:nvPr>
+            <p:ph type="body" idx="1"/>
+          </p:nvPr>
+        </p:nvSpPr>
+        <p:spPr/>
+        <p:txBody>
+          <a:bodyPr/>
+          <a:lstStyle/>
+          <a:p>
+            <a:r>
+              <a:rPr lang="ru-RU" dirty="0" smtClean="0"/>
+              <a:t>Ссылку добавить</a:t>
+            </a:r>
+            <a:endParaRPr lang="ru-RU" dirty="0"/>
+          </a:p>
+        </p:txBody>
+      </p:sp>
+      <p:sp>
+        <p:nvSpPr>
+          <p:cNvPr id="4" name="Номер слайда 3"/>
+          <p:cNvSpPr>
+            <a:spLocks noGrp="1"/>
+          </p:cNvSpPr>
+          <p:nvPr>
+            <p:ph type="sldNum" sz="quarter" idx="10"/>
+          </p:nvPr>
+        </p:nvSpPr>
+        <p:spPr/>
+        <p:txBody>
+          <a:bodyPr/>
+          <a:lstStyle/>
+          <a:p>
+            <a:fld id="{523F9C85-0776-451D-BE9D-6AE720D20092}" type="slidenum">
+              <a:rPr lang="ru-RU" smtClean="0"/>
+              <a:t>52</a:t>
+            </a:fld>
+            <a:endParaRPr lang="ru-RU"/>
+          </a:p>
+        </p:txBody>
+      </p:sp>
+    </p:spTree>
+    <p:extLst>
+      <p:ext uri="{BB962C8B-B14F-4D97-AF65-F5344CB8AC3E}">
+        <p14:creationId xmlns:p14="http://schemas.microsoft.com/office/powerpoint/2010/main" val="592892069"/>
       </p:ext>
     </p:extLst>
   </p:cSld>
@@ -25842,7 +25931,7 @@
       </p:sp>
       <p:pic>
         <p:nvPicPr>
-          <p:cNvPr id="7" name="Рисунок 6"/>
+          <p:cNvPr id="4" name="Рисунок 3"/>
           <p:cNvPicPr>
             <a:picLocks noChangeAspect="1"/>
           </p:cNvPicPr>
@@ -25850,13 +25939,13 @@
         </p:nvPicPr>
         <p:blipFill rotWithShape="1">
           <a:blip r:embed="rId3"/>
-          <a:srcRect t="4829" b="4494"/>
+          <a:srcRect l="33521" t="64736" r="3277"/>
           <a:stretch/>
         </p:blipFill>
         <p:spPr>
           <a:xfrm>
-            <a:off x="1342109" y="1216112"/>
-            <a:ext cx="9507782" cy="5594437"/>
+            <a:off x="583698" y="1187519"/>
+            <a:ext cx="11205029" cy="5253698"/>
           </a:xfrm>
           <a:prstGeom prst="rect">
             <a:avLst/>
@@ -25873,11 +25962,11 @@
   <p:clrMapOvr>
     <a:masterClrMapping/>
   </p:clrMapOvr>
-  <mc:AlternateContent xmlns:mc="http://schemas.openxmlformats.org/markup-compatibility/2006">
-    <mc:Choice xmlns:p14="http://schemas.microsoft.com/office/powerpoint/2010/main" Requires="p14">
+  <mc:AlternateContent xmlns:mc="http://schemas.openxmlformats.org/markup-compatibility/2006" xmlns:p14="http://schemas.microsoft.com/office/powerpoint/2010/main">
+    <mc:Choice Requires="p14">
       <p:transition p14:dur="10"/>
     </mc:Choice>
-    <mc:Fallback>
+    <mc:Fallback xmlns="">
       <p:transition/>
     </mc:Fallback>
   </mc:AlternateContent>
@@ -26205,11 +26294,7 @@
           <a:p>
             <a:r>
               <a:rPr lang="ru-RU" dirty="0" smtClean="0"/>
-              <a:t> </a:t>
-            </a:r>
-            <a:r>
-              <a:rPr lang="ru-RU" dirty="0" smtClean="0"/>
-              <a:t>модуль – код, выполняющий единицу работы</a:t>
+              <a:t> модуль – код, выполняющий единицу работы</a:t>
             </a:r>
           </a:p>
           <a:p>
@@ -26265,11 +26350,7 @@
           <a:p>
             <a:r>
               <a:rPr lang="ru-RU" dirty="0" smtClean="0"/>
-              <a:t> </a:t>
-            </a:r>
-            <a:r>
-              <a:rPr lang="ru-RU" dirty="0" smtClean="0"/>
-              <a:t>умеем делать простой </a:t>
+              <a:t> умеем делать простой </a:t>
             </a:r>
             <a:r>
               <a:rPr lang="en-US" dirty="0" smtClean="0"/>
@@ -27244,11 +27325,7 @@
             <a:pPr fontAlgn="t"/>
             <a:r>
               <a:rPr lang="ru-RU" dirty="0" smtClean="0"/>
-              <a:t> </a:t>
-            </a:r>
-            <a:r>
-              <a:rPr lang="ru-RU" dirty="0" smtClean="0"/>
-              <a:t>Можем пропустить испорченный тест</a:t>
+              <a:t> Можем пропустить испорченный тест</a:t>
             </a:r>
           </a:p>
           <a:p>
@@ -27261,11 +27338,7 @@
             <a:pPr fontAlgn="t"/>
             <a:r>
               <a:rPr lang="ru-RU" dirty="0" smtClean="0"/>
-              <a:t> </a:t>
-            </a:r>
-            <a:r>
-              <a:rPr lang="ru-RU" dirty="0" smtClean="0"/>
-              <a:t>Можем делать различные предположения</a:t>
+              <a:t> Можем делать различные предположения</a:t>
             </a:r>
             <a:r>
               <a:rPr lang="ru-RU" dirty="0"/>
@@ -27673,11 +27746,7 @@
           <a:p>
             <a:r>
               <a:rPr lang="ru-RU" dirty="0" smtClean="0"/>
-              <a:t> </a:t>
-            </a:r>
-            <a:r>
-              <a:rPr lang="ru-RU" dirty="0" smtClean="0"/>
-              <a:t>Внешние</a:t>
+              <a:t> Внешние</a:t>
             </a:r>
             <a:endParaRPr lang="ru-RU" dirty="0"/>
           </a:p>
@@ -28004,21 +28073,13 @@
           <a:p>
             <a:r>
               <a:rPr lang="ru-RU" dirty="0" smtClean="0"/>
-              <a:t> </a:t>
-            </a:r>
+              <a:t> Изоляция</a:t>
+            </a:r>
+          </a:p>
+          <a:p>
             <a:r>
               <a:rPr lang="ru-RU" dirty="0" smtClean="0"/>
-              <a:t>Изоляция</a:t>
-            </a:r>
-          </a:p>
-          <a:p>
-            <a:r>
-              <a:rPr lang="ru-RU" dirty="0" smtClean="0"/>
-              <a:t> </a:t>
-            </a:r>
-            <a:r>
-              <a:rPr lang="ru-RU" dirty="0" smtClean="0"/>
-              <a:t>Обзор </a:t>
+              <a:t> Обзор </a:t>
             </a:r>
             <a:r>
               <a:rPr lang="en-US" dirty="0" smtClean="0"/>
@@ -28045,11 +28106,7 @@
             </a:r>
             <a:r>
               <a:rPr lang="ru-RU" dirty="0" smtClean="0"/>
-              <a:t> </a:t>
-            </a:r>
-            <a:r>
-              <a:rPr lang="ru-RU" dirty="0" smtClean="0"/>
-              <a:t>код</a:t>
+              <a:t> код</a:t>
             </a:r>
           </a:p>
           <a:p>
@@ -28235,25 +28292,17 @@
           <a:p>
             <a:r>
               <a:rPr lang="ru-RU" dirty="0" smtClean="0"/>
-              <a:t> </a:t>
-            </a:r>
+              <a:t> Добавить абстракцию</a:t>
+            </a:r>
+            <a:endParaRPr lang="en-US" dirty="0"/>
+          </a:p>
+          <a:p>
+            <a:endParaRPr lang="ru-RU" dirty="0" smtClean="0"/>
+          </a:p>
+          <a:p>
             <a:r>
               <a:rPr lang="ru-RU" dirty="0" smtClean="0"/>
-              <a:t>Добавить абстракцию</a:t>
-            </a:r>
-            <a:endParaRPr lang="en-US" dirty="0"/>
-          </a:p>
-          <a:p>
-            <a:endParaRPr lang="ru-RU" dirty="0" smtClean="0"/>
-          </a:p>
-          <a:p>
-            <a:r>
-              <a:rPr lang="ru-RU" dirty="0" smtClean="0"/>
-              <a:t> Заменить </a:t>
-            </a:r>
-            <a:r>
-              <a:rPr lang="ru-RU" dirty="0" smtClean="0"/>
-              <a:t>контролируемым объектом</a:t>
+              <a:t> Заменить контролируемым объектом</a:t>
             </a:r>
             <a:r>
               <a:rPr lang="ru-RU" dirty="0"/>
@@ -28370,11 +28419,7 @@
           <a:p>
             <a:r>
               <a:rPr lang="ru-RU" dirty="0" smtClean="0"/>
-              <a:t>Шов</a:t>
-            </a:r>
-            <a:r>
-              <a:rPr lang="ru-RU" dirty="0" smtClean="0"/>
-              <a:t> </a:t>
+              <a:t>Шов </a:t>
             </a:r>
             <a:r>
               <a:rPr lang="en-US" dirty="0" smtClean="0"/>
@@ -28413,7 +28458,6 @@
               <a:rPr lang="ru-RU" dirty="0" smtClean="0"/>
               <a:t>Место программы, куда можно подключить иную функциональность взамен существующей</a:t>
             </a:r>
-            <a:endParaRPr lang="ru-RU" dirty="0" smtClean="0"/>
           </a:p>
         </p:txBody>
       </p:sp>
@@ -28475,11 +28519,7 @@
           <a:p>
             <a:r>
               <a:rPr lang="ru-RU" dirty="0" smtClean="0"/>
-              <a:t> </a:t>
-            </a:r>
-            <a:r>
-              <a:rPr lang="ru-RU" dirty="0" smtClean="0"/>
-              <a:t>через конструктор</a:t>
+              <a:t> через конструктор</a:t>
             </a:r>
             <a:endParaRPr lang="en-US" dirty="0" smtClean="0"/>
           </a:p>
@@ -28514,11 +28554,7 @@
             <a:pPr lvl="1"/>
             <a:r>
               <a:rPr lang="ru-RU" dirty="0" smtClean="0"/>
-              <a:t> через </a:t>
-            </a:r>
-            <a:r>
-              <a:rPr lang="ru-RU" dirty="0" smtClean="0"/>
-              <a:t>параметр</a:t>
+              <a:t> через параметр</a:t>
             </a:r>
           </a:p>
           <a:p>
@@ -28531,7 +28567,6 @@
               <a:rPr lang="ru-RU" dirty="0" smtClean="0"/>
               <a:t>с помощью фабрики</a:t>
             </a:r>
-            <a:endParaRPr lang="ru-RU" dirty="0" smtClean="0"/>
           </a:p>
           <a:p>
             <a:pPr lvl="1"/>
@@ -28541,15 +28576,7 @@
             </a:r>
             <a:r>
               <a:rPr lang="ru-RU" dirty="0" smtClean="0"/>
-              <a:t>с </a:t>
-            </a:r>
-            <a:r>
-              <a:rPr lang="ru-RU" dirty="0" smtClean="0"/>
-              <a:t>помощью локального фабричного </a:t>
-            </a:r>
-            <a:r>
-              <a:rPr lang="ru-RU" dirty="0" smtClean="0"/>
-              <a:t>метода</a:t>
+              <a:t>с помощью локального фабричного метода</a:t>
             </a:r>
           </a:p>
         </p:txBody>
@@ -29363,19 +29390,7 @@
               <a:rPr lang="ru-RU" dirty="0" smtClean="0">
                 <a:latin typeface="+mj-lt"/>
               </a:rPr>
-              <a:t> </a:t>
-            </a:r>
-            <a:r>
-              <a:rPr lang="ru-RU" dirty="0" smtClean="0">
-                <a:latin typeface="+mj-lt"/>
-              </a:rPr>
-              <a:t>их написание требует </a:t>
-            </a:r>
-            <a:r>
-              <a:rPr lang="ru-RU" dirty="0" smtClean="0">
-                <a:latin typeface="+mj-lt"/>
-              </a:rPr>
-              <a:t>времени</a:t>
+              <a:t> их написание требует времени</a:t>
             </a:r>
             <a:endParaRPr lang="en-US" dirty="0" smtClean="0">
               <a:latin typeface="+mj-lt"/>
@@ -29394,13 +29409,7 @@
               <a:rPr lang="ru-RU" dirty="0" smtClean="0">
                 <a:latin typeface="+mj-lt"/>
               </a:rPr>
-              <a:t> трудно писать подделки для интерфейсов и классов с большим число методов, свойств, </a:t>
-            </a:r>
-            <a:r>
-              <a:rPr lang="ru-RU" dirty="0" smtClean="0">
-                <a:latin typeface="+mj-lt"/>
-              </a:rPr>
-              <a:t>событий</a:t>
+              <a:t> трудно писать подделки для интерфейсов и классов с большим число методов, свойств, событий</a:t>
             </a:r>
             <a:endParaRPr lang="en-US" dirty="0" smtClean="0">
               <a:latin typeface="+mj-lt"/>
@@ -29425,13 +29434,7 @@
               <a:rPr lang="ru-RU" dirty="0" smtClean="0">
                 <a:latin typeface="+mj-lt"/>
               </a:rPr>
-              <a:t>для сохранения состояния подставки требуется писать много стереотипного </a:t>
-            </a:r>
-            <a:r>
-              <a:rPr lang="ru-RU" dirty="0" smtClean="0">
-                <a:latin typeface="+mj-lt"/>
-              </a:rPr>
-              <a:t>кода</a:t>
+              <a:t>для сохранения состояния подставки требуется писать много стереотипного кода</a:t>
             </a:r>
             <a:endParaRPr lang="en-US" dirty="0" smtClean="0">
               <a:latin typeface="+mj-lt"/>
@@ -30317,13 +30320,7 @@
               <a:rPr lang="ru-RU" dirty="0" smtClean="0">
                 <a:latin typeface="+mj-lt"/>
               </a:rPr>
-              <a:t> </a:t>
-            </a:r>
-            <a:r>
-              <a:rPr lang="ru-RU" dirty="0" smtClean="0">
-                <a:latin typeface="+mj-lt"/>
-              </a:rPr>
-              <a:t>классы и т.д.)</a:t>
+              <a:t> классы и т.д.)</a:t>
             </a:r>
           </a:p>
           <a:p>
@@ -31828,19 +31825,7 @@
                           <a:ea typeface="Times New Roman" panose="02020603050405020304" pitchFamily="18" charset="0"/>
                           <a:cs typeface="Arial" panose="020B0604020202020204" pitchFamily="34" charset="0"/>
                         </a:rPr>
-                        <a:t> </a:t>
-                      </a:r>
-                      <a:r>
-                        <a:rPr lang="ru-RU" sz="2400" b="1" baseline="0" dirty="0" smtClean="0">
-                          <a:solidFill>
-                            <a:srgbClr val="222222"/>
-                          </a:solidFill>
-                          <a:effectLst/>
-                          <a:latin typeface="Arial" panose="020B0604020202020204" pitchFamily="34" charset="0"/>
-                          <a:ea typeface="Times New Roman" panose="02020603050405020304" pitchFamily="18" charset="0"/>
-                          <a:cs typeface="Arial" panose="020B0604020202020204" pitchFamily="34" charset="0"/>
-                        </a:rPr>
-                        <a:t>подделок</a:t>
+                        <a:t> подделок</a:t>
                       </a:r>
                       <a:endParaRPr lang="ru-RU" sz="3200" dirty="0">
                         <a:effectLst/>
@@ -32981,11 +32966,7 @@
           <a:p>
             <a:r>
               <a:rPr lang="ru-RU" b="1" dirty="0" smtClean="0"/>
-              <a:t>Рекомендации </a:t>
-            </a:r>
-            <a:r>
-              <a:rPr lang="ru-RU" b="1" dirty="0" smtClean="0"/>
-              <a:t>проектирования</a:t>
+              <a:t>Рекомендации проектирования</a:t>
             </a:r>
             <a:r>
               <a:rPr lang="en-US" b="1" dirty="0" smtClean="0"/>
@@ -33040,7 +33021,6 @@
               <a:rPr lang="ru-RU" dirty="0"/>
               <a:t>6</a:t>
             </a:r>
-            <a:endParaRPr lang="ru-RU" dirty="0"/>
           </a:p>
         </p:txBody>
       </p:sp>
@@ -33472,11 +33452,7 @@
           <a:p>
             <a:r>
               <a:rPr lang="ru-RU" b="1" dirty="0" smtClean="0"/>
-              <a:t>Рекомендации </a:t>
-            </a:r>
-            <a:r>
-              <a:rPr lang="ru-RU" b="1" dirty="0" smtClean="0"/>
-              <a:t>проектирования</a:t>
+              <a:t>Рекомендации проектирования</a:t>
             </a:r>
             <a:r>
               <a:rPr lang="en-US" b="1" dirty="0" smtClean="0"/>
@@ -33559,15 +33535,7 @@
           <a:p>
             <a:r>
               <a:rPr lang="ru-RU" dirty="0" smtClean="0"/>
-              <a:t> </a:t>
-            </a:r>
-            <a:r>
-              <a:rPr lang="ru-RU" dirty="0" smtClean="0"/>
-              <a:t>и</a:t>
-            </a:r>
-            <a:r>
-              <a:rPr lang="ru-RU" dirty="0" smtClean="0"/>
-              <a:t>збегайте </a:t>
+              <a:t> избегайте </a:t>
             </a:r>
             <a:r>
               <a:rPr lang="ru-RU" dirty="0"/>
@@ -34881,11 +34849,7 @@
           <a:p>
             <a:r>
               <a:rPr lang="ru-RU" dirty="0" smtClean="0"/>
-              <a:t>Цель </a:t>
-            </a:r>
-            <a:r>
-              <a:rPr lang="ru-RU" dirty="0" smtClean="0"/>
-              <a:t>тестирования</a:t>
+              <a:t>Цель тестирования</a:t>
             </a:r>
             <a:endParaRPr lang="ru-RU" dirty="0"/>
           </a:p>
@@ -35395,7 +35359,6 @@
               <a:rPr lang="ru-RU" dirty="0" smtClean="0"/>
               <a:t>подделок</a:t>
             </a:r>
-            <a:endParaRPr lang="ru-RU" dirty="0" smtClean="0"/>
           </a:p>
         </p:txBody>
       </p:sp>
@@ -35570,13 +35533,7 @@
               <a:rPr lang="ru-RU" dirty="0" smtClean="0">
                 <a:latin typeface="+mj-lt"/>
               </a:rPr>
-              <a:t>Требуют конкретного </a:t>
-            </a:r>
-            <a:r>
-              <a:rPr lang="ru-RU" dirty="0" smtClean="0">
-                <a:latin typeface="+mj-lt"/>
-              </a:rPr>
-              <a:t>окружения</a:t>
+              <a:t>Требуют конкретного окружения</a:t>
             </a:r>
           </a:p>
           <a:p>
@@ -36491,11 +36448,7 @@
             </a:r>
             <a:r>
               <a:rPr lang="ru-RU" dirty="0" smtClean="0"/>
-              <a:t>Придерживаться понятной </a:t>
-            </a:r>
-            <a:r>
-              <a:rPr lang="ru-RU" dirty="0" smtClean="0"/>
-              <a:t>иерархии</a:t>
+              <a:t>Придерживаться понятной иерархии</a:t>
             </a:r>
           </a:p>
           <a:p>
@@ -36945,13 +36898,7 @@
               <a:rPr lang="ru-RU" b="1" dirty="0" smtClean="0">
                 <a:latin typeface="Consolas" panose="020B0609020204030204" pitchFamily="49" charset="0"/>
               </a:rPr>
-              <a:t>[единица работы]_[сценарий]_[ожидаемое поведение</a:t>
-            </a:r>
-            <a:r>
-              <a:rPr lang="ru-RU" b="1" dirty="0" smtClean="0">
-                <a:latin typeface="Consolas" panose="020B0609020204030204" pitchFamily="49" charset="0"/>
-              </a:rPr>
-              <a:t>]</a:t>
+              <a:t>[единица работы]_[сценарий]_[ожидаемое поведение]</a:t>
             </a:r>
             <a:endParaRPr lang="ru-RU" dirty="0" smtClean="0"/>
           </a:p>
@@ -37456,13 +37403,7 @@
               <a:rPr lang="ru-RU" dirty="0" smtClean="0">
                 <a:latin typeface="+mj-lt"/>
               </a:rPr>
-              <a:t>Модульные и интеграционные в отдельных </a:t>
-            </a:r>
-            <a:r>
-              <a:rPr lang="ru-RU" dirty="0" smtClean="0">
-                <a:latin typeface="+mj-lt"/>
-              </a:rPr>
-              <a:t>проектах</a:t>
+              <a:t>Модульные и интеграционные в отдельных проектах</a:t>
             </a:r>
             <a:endParaRPr lang="ru-RU" dirty="0" smtClean="0"/>
           </a:p>
@@ -38090,13 +38031,7 @@
               <a:rPr lang="ru-RU" dirty="0" smtClean="0">
                 <a:latin typeface="+mj-lt"/>
               </a:rPr>
-              <a:t> </a:t>
-            </a:r>
-            <a:r>
-              <a:rPr lang="ru-RU" dirty="0" smtClean="0">
-                <a:latin typeface="+mj-lt"/>
-              </a:rPr>
-              <a:t>Выше качество, раньше находим дефекты, проверка </a:t>
+              <a:t> Выше качество, раньше находим дефекты, проверка </a:t>
             </a:r>
             <a:r>
               <a:rPr lang="en-US" dirty="0" smtClean="0">
@@ -38110,9 +38045,6 @@
               </a:rPr>
               <a:t>, устойчивость к изменениям</a:t>
             </a:r>
-            <a:endParaRPr lang="ru-RU" dirty="0" smtClean="0">
-              <a:latin typeface="+mj-lt"/>
-            </a:endParaRPr>
           </a:p>
         </p:txBody>
       </p:sp>
@@ -38897,7 +38829,7 @@
         </p:nvSpPr>
         <p:spPr>
           <a:xfrm>
-            <a:off x="1050778" y="1635635"/>
+            <a:off x="1050778" y="1225887"/>
             <a:ext cx="10090443" cy="5399996"/>
           </a:xfrm>
         </p:spPr>
@@ -38929,8 +38861,19 @@
               <a:rPr lang="ru-RU" dirty="0" smtClean="0">
                 <a:latin typeface="+mj-lt"/>
               </a:rPr>
-              <a:t> – Искусство автономного тестирования</a:t>
-            </a:r>
+              <a:t> – Искусство автономного </a:t>
+            </a:r>
+            <a:r>
+              <a:rPr lang="ru-RU" dirty="0" smtClean="0">
+                <a:latin typeface="+mj-lt"/>
+              </a:rPr>
+              <a:t>тестирования</a:t>
+            </a:r>
+            <a:endParaRPr lang="en-US" dirty="0" smtClean="0">
+              <a:latin typeface="+mj-lt"/>
+            </a:endParaRPr>
+          </a:p>
+          <a:p>
             <a:endParaRPr lang="en-US" dirty="0" smtClean="0">
               <a:latin typeface="+mj-lt"/>
             </a:endParaRPr>
@@ -38980,6 +38923,11 @@
               </a:rPr>
               <a:t>/</a:t>
             </a:r>
+            <a:endParaRPr lang="en-US" dirty="0" smtClean="0">
+              <a:latin typeface="+mj-lt"/>
+            </a:endParaRPr>
+          </a:p>
+          <a:p>
             <a:endParaRPr lang="ru-RU" dirty="0" smtClean="0">
               <a:latin typeface="+mj-lt"/>
             </a:endParaRPr>
@@ -39015,6 +38963,9 @@
             <a:endParaRPr lang="en-US" dirty="0" smtClean="0"/>
           </a:p>
           <a:p>
+            <a:endParaRPr lang="en-US" dirty="0" smtClean="0"/>
+          </a:p>
+          <a:p>
             <a:r>
               <a:rPr lang="en-US" dirty="0" smtClean="0"/>
               <a:t> </a:t>
@@ -39043,42 +38994,6 @@
               <a:t>github.com/Moq/moq4/wiki/Quickstart</a:t>
             </a:r>
             <a:endParaRPr lang="en-US" dirty="0" smtClean="0"/>
-          </a:p>
-          <a:p>
-            <a:r>
-              <a:rPr lang="en-US" dirty="0"/>
-              <a:t> </a:t>
-            </a:r>
-            <a:r>
-              <a:rPr lang="ru-RU" dirty="0" smtClean="0"/>
-              <a:t>Список </a:t>
-            </a:r>
-            <a:r>
-              <a:rPr lang="ru-RU" dirty="0" err="1" smtClean="0"/>
-              <a:t>ништяков</a:t>
-            </a:r>
-            <a:r>
-              <a:rPr lang="ru-RU" dirty="0" smtClean="0"/>
-              <a:t> для тестирования на </a:t>
-            </a:r>
-            <a:r>
-              <a:rPr lang="en-US" dirty="0" err="1" smtClean="0"/>
-              <a:t>.Net</a:t>
-            </a:r>
-            <a:r>
-              <a:rPr lang="en-US" dirty="0"/>
-              <a:t>:</a:t>
-            </a:r>
-            <a:br>
-              <a:rPr lang="en-US" dirty="0"/>
-            </a:br>
-            <a:r>
-              <a:rPr lang="en-US" dirty="0">
-                <a:hlinkClick r:id="rId6"/>
-              </a:rPr>
-              <a:t>https://github.com/dariusz-wozniak/List-of-Testing-Tools-and-Frameworks-for-.NET</a:t>
-            </a:r>
-            <a:endParaRPr lang="ru-RU" dirty="0" smtClean="0"/>
           </a:p>
         </p:txBody>
       </p:sp>
@@ -39227,7 +39142,7 @@
                                         <p:tgtEl>
                                           <p:spTgt spid="4">
                                             <p:txEl>
-                                              <p:pRg st="1" end="1"/>
+                                              <p:pRg st="2" end="2"/>
                                             </p:txEl>
                                           </p:spTgt>
                                         </p:tgtEl>
@@ -39245,7 +39160,7 @@
                                         <p:tgtEl>
                                           <p:spTgt spid="4">
                                             <p:txEl>
-                                              <p:pRg st="1" end="1"/>
+                                              <p:pRg st="2" end="2"/>
                                             </p:txEl>
                                           </p:spTgt>
                                         </p:tgtEl>
@@ -39288,7 +39203,7 @@
                                         <p:tgtEl>
                                           <p:spTgt spid="4">
                                             <p:txEl>
-                                              <p:pRg st="2" end="2"/>
+                                              <p:pRg st="4" end="4"/>
                                             </p:txEl>
                                           </p:spTgt>
                                         </p:tgtEl>
@@ -39306,7 +39221,7 @@
                                         <p:tgtEl>
                                           <p:spTgt spid="4">
                                             <p:txEl>
-                                              <p:pRg st="2" end="2"/>
+                                              <p:pRg st="4" end="4"/>
                                             </p:txEl>
                                           </p:spTgt>
                                         </p:tgtEl>
@@ -39349,7 +39264,7 @@
                                         <p:tgtEl>
                                           <p:spTgt spid="4">
                                             <p:txEl>
-                                              <p:pRg st="3" end="3"/>
+                                              <p:pRg st="6" end="6"/>
                                             </p:txEl>
                                           </p:spTgt>
                                         </p:tgtEl>
@@ -39367,68 +39282,7 @@
                                         <p:tgtEl>
                                           <p:spTgt spid="4">
                                             <p:txEl>
-                                              <p:pRg st="3" end="3"/>
-                                            </p:txEl>
-                                          </p:spTgt>
-                                        </p:tgtEl>
-                                      </p:cBhvr>
-                                    </p:animEffect>
-                                  </p:childTnLst>
-                                </p:cTn>
-                              </p:par>
-                            </p:childTnLst>
-                          </p:cTn>
-                        </p:par>
-                      </p:childTnLst>
-                    </p:cTn>
-                  </p:par>
-                  <p:par>
-                    <p:cTn id="23" fill="hold">
-                      <p:stCondLst>
-                        <p:cond delay="indefinite"/>
-                      </p:stCondLst>
-                      <p:childTnLst>
-                        <p:par>
-                          <p:cTn id="24" fill="hold">
-                            <p:stCondLst>
-                              <p:cond delay="0"/>
-                            </p:stCondLst>
-                            <p:childTnLst>
-                              <p:par>
-                                <p:cTn id="25" presetID="10" presetClass="entr" presetSubtype="0" fill="hold" nodeType="clickEffect">
-                                  <p:stCondLst>
-                                    <p:cond delay="0"/>
-                                  </p:stCondLst>
-                                  <p:childTnLst>
-                                    <p:set>
-                                      <p:cBhvr>
-                                        <p:cTn id="26" dur="1" fill="hold">
-                                          <p:stCondLst>
-                                            <p:cond delay="0"/>
-                                          </p:stCondLst>
-                                        </p:cTn>
-                                        <p:tgtEl>
-                                          <p:spTgt spid="4">
-                                            <p:txEl>
-                                              <p:pRg st="4" end="4"/>
-                                            </p:txEl>
-                                          </p:spTgt>
-                                        </p:tgtEl>
-                                        <p:attrNameLst>
-                                          <p:attrName>style.visibility</p:attrName>
-                                        </p:attrNameLst>
-                                      </p:cBhvr>
-                                      <p:to>
-                                        <p:strVal val="visible"/>
-                                      </p:to>
-                                    </p:set>
-                                    <p:animEffect transition="in" filter="fade">
-                                      <p:cBhvr>
-                                        <p:cTn id="27" dur="500"/>
-                                        <p:tgtEl>
-                                          <p:spTgt spid="4">
-                                            <p:txEl>
-                                              <p:pRg st="4" end="4"/>
+                                              <p:pRg st="6" end="6"/>
                                             </p:txEl>
                                           </p:spTgt>
                                         </p:tgtEl>
@@ -39492,6 +39346,489 @@
             <a:spLocks noGrp="1"/>
           </p:cNvSpPr>
           <p:nvPr>
+            <p:ph type="title"/>
+          </p:nvPr>
+        </p:nvSpPr>
+        <p:spPr/>
+        <p:txBody>
+          <a:bodyPr>
+            <a:normAutofit/>
+          </a:bodyPr>
+          <a:lstStyle/>
+          <a:p>
+            <a:r>
+              <a:rPr lang="ru-RU" dirty="0" smtClean="0"/>
+              <a:t>Ссылки и литература</a:t>
+            </a:r>
+            <a:endParaRPr lang="ru-RU" dirty="0"/>
+          </a:p>
+        </p:txBody>
+      </p:sp>
+      <p:sp>
+        <p:nvSpPr>
+          <p:cNvPr id="4" name="Текст 2"/>
+          <p:cNvSpPr>
+            <a:spLocks noGrp="1"/>
+          </p:cNvSpPr>
+          <p:nvPr>
+            <p:ph type="body" sz="quarter" idx="13"/>
+          </p:nvPr>
+        </p:nvSpPr>
+        <p:spPr>
+          <a:xfrm>
+            <a:off x="1050778" y="1410553"/>
+            <a:ext cx="10090443" cy="5399996"/>
+          </a:xfrm>
+        </p:spPr>
+        <p:txBody>
+          <a:bodyPr>
+            <a:noAutofit/>
+          </a:bodyPr>
+          <a:lstStyle/>
+          <a:p>
+            <a:r>
+              <a:rPr lang="ru-RU" dirty="0" smtClean="0">
+                <a:latin typeface="+mj-lt"/>
+              </a:rPr>
+              <a:t> Создание своих атрибутов для </a:t>
+            </a:r>
+            <a:r>
+              <a:rPr lang="en-US" dirty="0" err="1" smtClean="0">
+                <a:latin typeface="+mj-lt"/>
+              </a:rPr>
+              <a:t>xUnit</a:t>
+            </a:r>
+            <a:r>
+              <a:rPr lang="ru-RU" dirty="0" smtClean="0">
+                <a:latin typeface="+mj-lt"/>
+              </a:rPr>
+              <a:t> (чтения данных из файла)</a:t>
+            </a:r>
+            <a:r>
+              <a:rPr lang="en-US" dirty="0" smtClean="0">
+                <a:latin typeface="+mj-lt"/>
+              </a:rPr>
+              <a:t>:</a:t>
+            </a:r>
+            <a:r>
+              <a:rPr lang="en-US" dirty="0" smtClean="0">
+                <a:latin typeface="+mj-lt"/>
+              </a:rPr>
+              <a:t/>
+            </a:r>
+            <a:br>
+              <a:rPr lang="en-US" dirty="0" smtClean="0">
+                <a:latin typeface="+mj-lt"/>
+              </a:rPr>
+            </a:br>
+            <a:r>
+              <a:rPr lang="en-US" dirty="0">
+                <a:latin typeface="+mj-lt"/>
+                <a:hlinkClick r:id="rId3"/>
+              </a:rPr>
+              <a:t>https://andrewlock.net/creating-a-custom-xunit-theory-test-dataattribute-to-load-data-from-json-files</a:t>
+            </a:r>
+            <a:r>
+              <a:rPr lang="en-US" dirty="0" smtClean="0">
+                <a:latin typeface="+mj-lt"/>
+                <a:hlinkClick r:id="rId3"/>
+              </a:rPr>
+              <a:t>/</a:t>
+            </a:r>
+            <a:endParaRPr lang="en-US" dirty="0" smtClean="0">
+              <a:latin typeface="+mj-lt"/>
+            </a:endParaRPr>
+          </a:p>
+          <a:p>
+            <a:endParaRPr lang="en-US" dirty="0" smtClean="0">
+              <a:latin typeface="+mj-lt"/>
+            </a:endParaRPr>
+          </a:p>
+          <a:p>
+            <a:r>
+              <a:rPr lang="ru-RU" dirty="0" smtClean="0"/>
+              <a:t> </a:t>
+            </a:r>
+            <a:r>
+              <a:rPr lang="en-US" dirty="0"/>
+              <a:t> </a:t>
+            </a:r>
+            <a:r>
+              <a:rPr lang="ru-RU" dirty="0"/>
+              <a:t>Список </a:t>
+            </a:r>
+            <a:r>
+              <a:rPr lang="ru-RU" dirty="0" err="1"/>
+              <a:t>ништяков</a:t>
+            </a:r>
+            <a:r>
+              <a:rPr lang="ru-RU" dirty="0"/>
+              <a:t> для тестирования на </a:t>
+            </a:r>
+            <a:r>
+              <a:rPr lang="en-US" dirty="0" err="1"/>
+              <a:t>.Net</a:t>
+            </a:r>
+            <a:r>
+              <a:rPr lang="en-US" dirty="0"/>
+              <a:t>:</a:t>
+            </a:r>
+            <a:br>
+              <a:rPr lang="en-US" dirty="0"/>
+            </a:br>
+            <a:r>
+              <a:rPr lang="en-US" dirty="0">
+                <a:hlinkClick r:id="rId4"/>
+              </a:rPr>
+              <a:t>https://github.com/dariusz-wozniak/List-of-Testing-Tools-and-Frameworks-for-.</a:t>
+            </a:r>
+            <a:r>
+              <a:rPr lang="en-US" dirty="0" smtClean="0">
+                <a:hlinkClick r:id="rId4"/>
+              </a:rPr>
+              <a:t>NET</a:t>
+            </a:r>
+            <a:endParaRPr lang="en-US" dirty="0" smtClean="0"/>
+          </a:p>
+          <a:p>
+            <a:endParaRPr lang="ru-RU" dirty="0"/>
+          </a:p>
+          <a:p>
+            <a:r>
+              <a:rPr lang="en-US" dirty="0" smtClean="0"/>
+              <a:t> </a:t>
+            </a:r>
+            <a:r>
+              <a:rPr lang="ru-RU" dirty="0" smtClean="0"/>
+              <a:t>Репозиторий с кодом </a:t>
+            </a:r>
+            <a:r>
+              <a:rPr lang="en-US" dirty="0" smtClean="0"/>
+              <a:t>:</a:t>
+            </a:r>
+            <a:r>
+              <a:rPr lang="en-US" dirty="0"/>
+              <a:t/>
+            </a:r>
+            <a:br>
+              <a:rPr lang="en-US" dirty="0"/>
+            </a:br>
+            <a:r>
+              <a:rPr lang="en-US" dirty="0">
+                <a:hlinkClick r:id="rId5"/>
+              </a:rPr>
+              <a:t>https</a:t>
+            </a:r>
+            <a:r>
+              <a:rPr lang="en-US">
+                <a:hlinkClick r:id="rId5"/>
+              </a:rPr>
+              <a:t>://</a:t>
+            </a:r>
+            <a:r>
+              <a:rPr lang="en-US" smtClean="0">
+                <a:hlinkClick r:id="rId5"/>
+              </a:rPr>
+              <a:t>github.com/Markeli/BugsStrikesBack</a:t>
+            </a:r>
+            <a:endParaRPr lang="en-US" smtClean="0"/>
+          </a:p>
+          <a:p>
+            <a:pPr marL="0" indent="0">
+              <a:buNone/>
+            </a:pPr>
+            <a:endParaRPr lang="ru-RU" dirty="0" smtClean="0"/>
+          </a:p>
+        </p:txBody>
+      </p:sp>
+      <p:sp>
+        <p:nvSpPr>
+          <p:cNvPr id="5" name="TextBox 4"/>
+          <p:cNvSpPr txBox="1"/>
+          <p:nvPr/>
+        </p:nvSpPr>
+        <p:spPr>
+          <a:xfrm>
+            <a:off x="11788727" y="6441217"/>
+            <a:ext cx="437940" cy="369332"/>
+          </a:xfrm>
+          <a:prstGeom prst="rect">
+            <a:avLst/>
+          </a:prstGeom>
+          <a:noFill/>
+        </p:spPr>
+        <p:txBody>
+          <a:bodyPr wrap="none" rtlCol="0">
+            <a:spAutoFit/>
+          </a:bodyPr>
+          <a:lstStyle/>
+          <a:p>
+            <a:r>
+              <a:rPr lang="ru-RU" dirty="0" smtClean="0"/>
+              <a:t>51</a:t>
+            </a:r>
+            <a:endParaRPr lang="ru-RU" dirty="0"/>
+          </a:p>
+        </p:txBody>
+      </p:sp>
+    </p:spTree>
+    <p:extLst>
+      <p:ext uri="{BB962C8B-B14F-4D97-AF65-F5344CB8AC3E}">
+        <p14:creationId xmlns:p14="http://schemas.microsoft.com/office/powerpoint/2010/main" val="2559873321"/>
+      </p:ext>
+    </p:extLst>
+  </p:cSld>
+  <p:clrMapOvr>
+    <a:masterClrMapping/>
+  </p:clrMapOvr>
+  <mc:AlternateContent xmlns:mc="http://schemas.openxmlformats.org/markup-compatibility/2006" xmlns:p14="http://schemas.microsoft.com/office/powerpoint/2010/main">
+    <mc:Choice Requires="p14">
+      <p:transition p14:dur="0"/>
+    </mc:Choice>
+    <mc:Fallback xmlns="">
+      <p:transition/>
+    </mc:Fallback>
+  </mc:AlternateContent>
+  <p:timing>
+    <p:tnLst>
+      <p:par>
+        <p:cTn id="1" dur="indefinite" restart="never" nodeType="tmRoot">
+          <p:childTnLst>
+            <p:seq concurrent="1" nextAc="seek">
+              <p:cTn id="2" dur="indefinite" nodeType="mainSeq">
+                <p:childTnLst>
+                  <p:par>
+                    <p:cTn id="3" fill="hold">
+                      <p:stCondLst>
+                        <p:cond delay="indefinite"/>
+                      </p:stCondLst>
+                      <p:childTnLst>
+                        <p:par>
+                          <p:cTn id="4" fill="hold">
+                            <p:stCondLst>
+                              <p:cond delay="0"/>
+                            </p:stCondLst>
+                            <p:childTnLst>
+                              <p:par>
+                                <p:cTn id="5" presetID="10" presetClass="entr" presetSubtype="0" fill="hold" nodeType="clickEffect">
+                                  <p:stCondLst>
+                                    <p:cond delay="0"/>
+                                  </p:stCondLst>
+                                  <p:childTnLst>
+                                    <p:set>
+                                      <p:cBhvr>
+                                        <p:cTn id="6" dur="1" fill="hold">
+                                          <p:stCondLst>
+                                            <p:cond delay="0"/>
+                                          </p:stCondLst>
+                                        </p:cTn>
+                                        <p:tgtEl>
+                                          <p:spTgt spid="4">
+                                            <p:txEl>
+                                              <p:pRg st="0" end="0"/>
+                                            </p:txEl>
+                                          </p:spTgt>
+                                        </p:tgtEl>
+                                        <p:attrNameLst>
+                                          <p:attrName>style.visibility</p:attrName>
+                                        </p:attrNameLst>
+                                      </p:cBhvr>
+                                      <p:to>
+                                        <p:strVal val="visible"/>
+                                      </p:to>
+                                    </p:set>
+                                    <p:animEffect transition="in" filter="fade">
+                                      <p:cBhvr>
+                                        <p:cTn id="7" dur="500"/>
+                                        <p:tgtEl>
+                                          <p:spTgt spid="4">
+                                            <p:txEl>
+                                              <p:pRg st="0" end="0"/>
+                                            </p:txEl>
+                                          </p:spTgt>
+                                        </p:tgtEl>
+                                      </p:cBhvr>
+                                    </p:animEffect>
+                                  </p:childTnLst>
+                                </p:cTn>
+                              </p:par>
+                            </p:childTnLst>
+                          </p:cTn>
+                        </p:par>
+                      </p:childTnLst>
+                    </p:cTn>
+                  </p:par>
+                  <p:par>
+                    <p:cTn id="8" fill="hold">
+                      <p:stCondLst>
+                        <p:cond delay="indefinite"/>
+                      </p:stCondLst>
+                      <p:childTnLst>
+                        <p:par>
+                          <p:cTn id="9" fill="hold">
+                            <p:stCondLst>
+                              <p:cond delay="0"/>
+                            </p:stCondLst>
+                            <p:childTnLst>
+                              <p:par>
+                                <p:cTn id="10" presetID="10" presetClass="entr" presetSubtype="0" fill="hold" nodeType="clickEffect">
+                                  <p:stCondLst>
+                                    <p:cond delay="0"/>
+                                  </p:stCondLst>
+                                  <p:childTnLst>
+                                    <p:set>
+                                      <p:cBhvr>
+                                        <p:cTn id="11" dur="1" fill="hold">
+                                          <p:stCondLst>
+                                            <p:cond delay="0"/>
+                                          </p:stCondLst>
+                                        </p:cTn>
+                                        <p:tgtEl>
+                                          <p:spTgt spid="4">
+                                            <p:txEl>
+                                              <p:pRg st="2" end="2"/>
+                                            </p:txEl>
+                                          </p:spTgt>
+                                        </p:tgtEl>
+                                        <p:attrNameLst>
+                                          <p:attrName>style.visibility</p:attrName>
+                                        </p:attrNameLst>
+                                      </p:cBhvr>
+                                      <p:to>
+                                        <p:strVal val="visible"/>
+                                      </p:to>
+                                    </p:set>
+                                    <p:animEffect transition="in" filter="fade">
+                                      <p:cBhvr>
+                                        <p:cTn id="12" dur="500"/>
+                                        <p:tgtEl>
+                                          <p:spTgt spid="4">
+                                            <p:txEl>
+                                              <p:pRg st="2" end="2"/>
+                                            </p:txEl>
+                                          </p:spTgt>
+                                        </p:tgtEl>
+                                      </p:cBhvr>
+                                    </p:animEffect>
+                                  </p:childTnLst>
+                                </p:cTn>
+                              </p:par>
+                            </p:childTnLst>
+                          </p:cTn>
+                        </p:par>
+                      </p:childTnLst>
+                    </p:cTn>
+                  </p:par>
+                  <p:par>
+                    <p:cTn id="13" fill="hold">
+                      <p:stCondLst>
+                        <p:cond delay="indefinite"/>
+                      </p:stCondLst>
+                      <p:childTnLst>
+                        <p:par>
+                          <p:cTn id="14" fill="hold">
+                            <p:stCondLst>
+                              <p:cond delay="0"/>
+                            </p:stCondLst>
+                            <p:childTnLst>
+                              <p:par>
+                                <p:cTn id="15" presetID="10" presetClass="entr" presetSubtype="0" fill="hold" nodeType="clickEffect">
+                                  <p:stCondLst>
+                                    <p:cond delay="0"/>
+                                  </p:stCondLst>
+                                  <p:childTnLst>
+                                    <p:set>
+                                      <p:cBhvr>
+                                        <p:cTn id="16" dur="1" fill="hold">
+                                          <p:stCondLst>
+                                            <p:cond delay="0"/>
+                                          </p:stCondLst>
+                                        </p:cTn>
+                                        <p:tgtEl>
+                                          <p:spTgt spid="4">
+                                            <p:txEl>
+                                              <p:pRg st="4" end="4"/>
+                                            </p:txEl>
+                                          </p:spTgt>
+                                        </p:tgtEl>
+                                        <p:attrNameLst>
+                                          <p:attrName>style.visibility</p:attrName>
+                                        </p:attrNameLst>
+                                      </p:cBhvr>
+                                      <p:to>
+                                        <p:strVal val="visible"/>
+                                      </p:to>
+                                    </p:set>
+                                    <p:animEffect transition="in" filter="fade">
+                                      <p:cBhvr>
+                                        <p:cTn id="17" dur="500"/>
+                                        <p:tgtEl>
+                                          <p:spTgt spid="4">
+                                            <p:txEl>
+                                              <p:pRg st="4" end="4"/>
+                                            </p:txEl>
+                                          </p:spTgt>
+                                        </p:tgtEl>
+                                      </p:cBhvr>
+                                    </p:animEffect>
+                                  </p:childTnLst>
+                                </p:cTn>
+                              </p:par>
+                            </p:childTnLst>
+                          </p:cTn>
+                        </p:par>
+                      </p:childTnLst>
+                    </p:cTn>
+                  </p:par>
+                </p:childTnLst>
+              </p:cTn>
+              <p:prevCondLst>
+                <p:cond evt="onPrev" delay="0">
+                  <p:tgtEl>
+                    <p:sldTgt/>
+                  </p:tgtEl>
+                </p:cond>
+              </p:prevCondLst>
+              <p:nextCondLst>
+                <p:cond evt="onNext" delay="0">
+                  <p:tgtEl>
+                    <p:sldTgt/>
+                  </p:tgtEl>
+                </p:cond>
+              </p:nextCondLst>
+            </p:seq>
+          </p:childTnLst>
+        </p:cTn>
+      </p:par>
+    </p:tnLst>
+  </p:timing>
+</p:sld>
+</file>
+
+<file path=ppt/slides/slide53.xml><?xml version="1.0" encoding="utf-8"?>
+<p:sld xmlns:a="http://schemas.openxmlformats.org/drawingml/2006/main" xmlns:r="http://schemas.openxmlformats.org/officeDocument/2006/relationships" xmlns:p="http://schemas.openxmlformats.org/presentationml/2006/main">
+  <p:cSld>
+    <p:spTree>
+      <p:nvGrpSpPr>
+        <p:cNvPr id="1" name=""/>
+        <p:cNvGrpSpPr/>
+        <p:nvPr/>
+      </p:nvGrpSpPr>
+      <p:grpSpPr>
+        <a:xfrm>
+          <a:off x="0" y="0"/>
+          <a:ext cx="0" cy="0"/>
+          <a:chOff x="0" y="0"/>
+          <a:chExt cx="0" cy="0"/>
+        </a:xfrm>
+      </p:grpSpPr>
+      <p:sp>
+        <p:nvSpPr>
+          <p:cNvPr id="2" name="Заголовок 1"/>
+          <p:cNvSpPr>
+            <a:spLocks noGrp="1"/>
+          </p:cNvSpPr>
+          <p:nvPr>
             <p:ph type="ctrTitle"/>
           </p:nvPr>
         </p:nvSpPr>
@@ -39543,7 +39880,7 @@
 </p:sld>
 </file>
 
-<file path=ppt/slides/slide53.xml><?xml version="1.0" encoding="utf-8"?>
+<file path=ppt/slides/slide54.xml><?xml version="1.0" encoding="utf-8"?>
 <p:sld xmlns:a="http://schemas.openxmlformats.org/drawingml/2006/main" xmlns:r="http://schemas.openxmlformats.org/officeDocument/2006/relationships" xmlns:p="http://schemas.openxmlformats.org/presentationml/2006/main">
   <p:cSld>
     <p:spTree>
@@ -39684,11 +40021,7 @@
           <a:p>
             <a:r>
               <a:rPr lang="ru-RU" dirty="0" smtClean="0"/>
-              <a:t>Определение </a:t>
-            </a:r>
-            <a:r>
-              <a:rPr lang="ru-RU" dirty="0" smtClean="0"/>
-              <a:t>модуля</a:t>
+              <a:t>Определение модуля</a:t>
             </a:r>
             <a:endParaRPr lang="ru-RU" dirty="0"/>
           </a:p>
@@ -39731,13 +40064,8 @@
           <a:p>
             <a:r>
               <a:rPr lang="ru-RU" dirty="0" smtClean="0"/>
-              <a:t> </a:t>
-            </a:r>
-            <a:r>
-              <a:rPr lang="ru-RU" dirty="0" smtClean="0"/>
-              <a:t>возвращенное значение из метода</a:t>
-            </a:r>
-            <a:endParaRPr lang="ru-RU" dirty="0" smtClean="0"/>
+              <a:t> возвращенное значение из метода</a:t>
+            </a:r>
           </a:p>
           <a:p>
             <a:pPr marL="0" indent="0">
@@ -39762,7 +40090,6 @@
               <a:rPr lang="ru-RU" dirty="0" smtClean="0"/>
               <a:t>системы</a:t>
             </a:r>
-            <a:endParaRPr lang="ru-RU" dirty="0" smtClean="0"/>
           </a:p>
           <a:p>
             <a:pPr marL="0" indent="0">
@@ -39787,7 +40114,6 @@
               <a:rPr lang="ru-RU" dirty="0" smtClean="0"/>
               <a:t>системе </a:t>
             </a:r>
-            <a:endParaRPr lang="ru-RU" dirty="0" smtClean="0"/>
           </a:p>
         </p:txBody>
       </p:sp>
@@ -39817,7 +40143,6 @@
               <a:rPr lang="ru-RU" dirty="0"/>
               <a:t>6</a:t>
             </a:r>
-            <a:endParaRPr lang="ru-RU" dirty="0"/>
           </a:p>
         </p:txBody>
       </p:sp>
@@ -40192,11 +40517,7 @@
             </a:pPr>
             <a:r>
               <a:rPr lang="ru-RU" dirty="0" smtClean="0"/>
-              <a:t>Код, который </a:t>
-            </a:r>
-            <a:r>
-              <a:rPr lang="ru-RU" dirty="0" smtClean="0"/>
-              <a:t>вызывает </a:t>
+              <a:t>Код, который вызывает </a:t>
             </a:r>
             <a:r>
               <a:rPr lang="ru-RU" dirty="0"/>
@@ -40242,7 +40563,6 @@
               <a:rPr lang="ru-RU" dirty="0"/>
               <a:t>7</a:t>
             </a:r>
-            <a:endParaRPr lang="ru-RU" dirty="0"/>
           </a:p>
         </p:txBody>
       </p:sp>
@@ -40348,19 +40668,7 @@
           <a:p>
             <a:r>
               <a:rPr lang="ru-RU" dirty="0" smtClean="0"/>
-              <a:t> </a:t>
-            </a:r>
-            <a:r>
-              <a:rPr lang="ru-RU" dirty="0" smtClean="0"/>
-              <a:t>автоматизирован </a:t>
-            </a:r>
-            <a:r>
-              <a:rPr lang="ru-RU" dirty="0" smtClean="0"/>
-              <a:t>и </a:t>
-            </a:r>
-            <a:r>
-              <a:rPr lang="ru-RU" dirty="0" smtClean="0"/>
-              <a:t>повторяем</a:t>
+              <a:t> автоматизирован и повторяем</a:t>
             </a:r>
           </a:p>
           <a:p>
@@ -40372,36 +40680,18 @@
           <a:p>
             <a:r>
               <a:rPr lang="ru-RU" dirty="0"/>
-              <a:t> </a:t>
-            </a:r>
-            <a:r>
-              <a:rPr lang="ru-RU" dirty="0"/>
-              <a:t>сохраняет </a:t>
+              <a:t> сохраняет </a:t>
             </a:r>
             <a:r>
               <a:rPr lang="ru-RU" dirty="0" smtClean="0"/>
               <a:t>актуальность</a:t>
             </a:r>
-            <a:endParaRPr lang="ru-RU" dirty="0" smtClean="0"/>
           </a:p>
           <a:p>
             <a:r>
               <a:rPr lang="ru-RU" dirty="0" smtClean="0"/>
-              <a:t> </a:t>
-            </a:r>
-            <a:r>
-              <a:rPr lang="ru-RU" dirty="0" smtClean="0"/>
-              <a:t>прост </a:t>
-            </a:r>
-            <a:r>
-              <a:rPr lang="ru-RU" dirty="0" smtClean="0"/>
-              <a:t>в </a:t>
-            </a:r>
-            <a:r>
-              <a:rPr lang="ru-RU" dirty="0" smtClean="0"/>
-              <a:t>реализации</a:t>
-            </a:r>
-            <a:endParaRPr lang="ru-RU" dirty="0" smtClean="0"/>
+              <a:t> прост в реализации</a:t>
+            </a:r>
           </a:p>
           <a:p>
             <a:r>
@@ -40410,11 +40700,7 @@
             </a:r>
             <a:r>
               <a:rPr lang="ru-RU" dirty="0" smtClean="0"/>
-              <a:t>быстрый </a:t>
-            </a:r>
-            <a:r>
-              <a:rPr lang="ru-RU" dirty="0" smtClean="0"/>
-              <a:t>запуск</a:t>
+              <a:t>быстрый запуск</a:t>
             </a:r>
             <a:endParaRPr lang="ru-RU" dirty="0"/>
           </a:p>
@@ -40428,11 +40714,7 @@
           <a:p>
             <a:r>
               <a:rPr lang="ru-RU" dirty="0" smtClean="0"/>
-              <a:t> полностью </a:t>
-            </a:r>
-            <a:r>
-              <a:rPr lang="ru-RU" dirty="0" smtClean="0"/>
-              <a:t>контролирует </a:t>
+              <a:t> полностью контролирует </a:t>
             </a:r>
             <a:r>
               <a:rPr lang="en-US" dirty="0" smtClean="0"/>
@@ -40450,11 +40732,7 @@
           <a:p>
             <a:r>
               <a:rPr lang="ru-RU" dirty="0" smtClean="0"/>
-              <a:t> понятная причина </a:t>
-            </a:r>
-            <a:r>
-              <a:rPr lang="ru-RU" dirty="0" smtClean="0"/>
-              <a:t>ошибки</a:t>
+              <a:t> понятная причина ошибки</a:t>
             </a:r>
             <a:endParaRPr lang="ru-RU" dirty="0"/>
           </a:p>
@@ -40624,7 +40902,6 @@
               <a:rPr lang="ru-RU" dirty="0"/>
               <a:t>8</a:t>
             </a:r>
-            <a:endParaRPr lang="ru-RU" dirty="0"/>
           </a:p>
         </p:txBody>
       </p:sp>
@@ -41306,11 +41583,7 @@
             </a:pPr>
             <a:r>
               <a:rPr lang="ru-RU" dirty="0" smtClean="0"/>
-              <a:t>Рекомендуется следующая структура </a:t>
-            </a:r>
-            <a:r>
-              <a:rPr lang="ru-RU" dirty="0" smtClean="0"/>
-              <a:t>теста</a:t>
+              <a:t>Рекомендуется следующая структура теста</a:t>
             </a:r>
             <a:r>
               <a:rPr lang="en-US" dirty="0" smtClean="0"/>
@@ -41334,13 +41607,7 @@
               <a:rPr lang="ru-RU" dirty="0" smtClean="0">
                 <a:latin typeface="+mn-lt"/>
               </a:rPr>
-              <a:t>подготовка </a:t>
-            </a:r>
-            <a:r>
-              <a:rPr lang="ru-RU" dirty="0" smtClean="0">
-                <a:latin typeface="+mn-lt"/>
-              </a:rPr>
-              <a:t>(</a:t>
+              <a:t>подготовка (</a:t>
             </a:r>
             <a:r>
               <a:rPr lang="en-US" dirty="0" smtClean="0">
@@ -41362,13 +41629,7 @@
               <a:rPr lang="ru-RU" dirty="0" smtClean="0">
                 <a:latin typeface="+mn-lt"/>
               </a:rPr>
-              <a:t> </a:t>
-            </a:r>
-            <a:r>
-              <a:rPr lang="ru-RU" dirty="0" smtClean="0">
-                <a:latin typeface="+mn-lt"/>
-              </a:rPr>
-              <a:t>действие</a:t>
+              <a:t> действие</a:t>
             </a:r>
             <a:r>
               <a:rPr lang="en-US" dirty="0" smtClean="0">

</xml_diff>